<commit_message>
Infinite workshop plan and outro amends
</commit_message>
<xml_diff>
--- a/06 Outro/Architecture_Workshop_Outro.pptx
+++ b/06 Outro/Architecture_Workshop_Outro.pptx
@@ -109,6 +109,36 @@
       </a:defRPr>
     </a:lvl9pPr>
   </p:defaultTextStyle>
+  <p:extLst>
+    <p:ext uri="{EFAFB233-063F-42B5-8137-9DF3F51BA10A}">
+      <p15:sldGuideLst xmlns:p15="http://schemas.microsoft.com/office/powerpoint/2012/main">
+        <p15:guide id="1" orient="horz" pos="2160">
+          <p15:clr>
+            <a:srgbClr val="A4A3A4"/>
+          </p15:clr>
+        </p15:guide>
+        <p15:guide id="2" pos="2880">
+          <p15:clr>
+            <a:srgbClr val="A4A3A4"/>
+          </p15:clr>
+        </p15:guide>
+      </p15:sldGuideLst>
+    </p:ext>
+    <p:ext uri="{2D200454-40CA-4A62-9FC3-DE9A4176ACB9}">
+      <p15:notesGuideLst xmlns:p15="http://schemas.microsoft.com/office/powerpoint/2012/main">
+        <p15:guide id="1" orient="horz" pos="3126">
+          <p15:clr>
+            <a:srgbClr val="A4A3A4"/>
+          </p15:clr>
+        </p15:guide>
+        <p15:guide id="2" pos="2141">
+          <p15:clr>
+            <a:srgbClr val="A4A3A4"/>
+          </p15:clr>
+        </p15:guide>
+      </p15:notesGuideLst>
+    </p:ext>
+  </p:extLst>
 </p:presentation>
 </file>
 
@@ -194,7 +224,7 @@
           <a:p>
             <a:fld id="{14BAE693-6910-45CC-A0F0-E7002C65F0F7}" type="datetimeFigureOut">
               <a:rPr lang="en-GB" smtClean="0"/>
-              <a:t>06/03/16</a:t>
+              <a:t>25/05/2018</a:t>
             </a:fld>
             <a:endParaRPr lang="en-GB"/>
           </a:p>
@@ -258,35 +288,35 @@
           <a:p>
             <a:pPr lvl="0"/>
             <a:r>
-              <a:rPr lang="en-US" smtClean="0"/>
+              <a:rPr lang="en-US"/>
               <a:t>Click to edit Master text styles</a:t>
             </a:r>
           </a:p>
           <a:p>
             <a:pPr lvl="1"/>
             <a:r>
-              <a:rPr lang="en-US" smtClean="0"/>
+              <a:rPr lang="en-US"/>
               <a:t>Second level</a:t>
             </a:r>
           </a:p>
           <a:p>
             <a:pPr lvl="2"/>
             <a:r>
-              <a:rPr lang="en-US" smtClean="0"/>
+              <a:rPr lang="en-US"/>
               <a:t>Third level</a:t>
             </a:r>
           </a:p>
           <a:p>
             <a:pPr lvl="3"/>
             <a:r>
-              <a:rPr lang="en-US" smtClean="0"/>
+              <a:rPr lang="en-US"/>
               <a:t>Fourth level</a:t>
             </a:r>
           </a:p>
           <a:p>
             <a:pPr lvl="4"/>
             <a:r>
-              <a:rPr lang="en-US" smtClean="0"/>
+              <a:rPr lang="en-US"/>
               <a:t>Fifth level</a:t>
             </a:r>
             <a:endParaRPr lang="en-GB"/>
@@ -752,10 +782,9 @@
           <a:lstStyle/>
           <a:p>
             <a:r>
-              <a:rPr lang="en-US" smtClean="0"/>
+              <a:rPr lang="en-US"/>
               <a:t>Click to edit Master title style</a:t>
             </a:r>
-            <a:endParaRPr lang="en-US"/>
           </a:p>
         </p:txBody>
       </p:sp>
@@ -871,10 +900,9 @@
           </a:lstStyle>
           <a:p>
             <a:r>
-              <a:rPr lang="en-US" smtClean="0"/>
+              <a:rPr lang="en-US"/>
               <a:t>Click to edit Master subtitle style</a:t>
             </a:r>
-            <a:endParaRPr lang="en-US"/>
           </a:p>
         </p:txBody>
       </p:sp>
@@ -896,7 +924,7 @@
             <a:fld id="{1D8BD707-D9CF-40AE-B4C6-C98DA3205C09}" type="datetimeFigureOut">
               <a:rPr lang="en-US" smtClean="0"/>
               <a:pPr/>
-              <a:t>06/03/16</a:t>
+              <a:t>5/25/18</a:t>
             </a:fld>
             <a:endParaRPr lang="en-US"/>
           </a:p>
@@ -986,10 +1014,9 @@
           <a:lstStyle/>
           <a:p>
             <a:r>
-              <a:rPr lang="en-US" smtClean="0"/>
+              <a:rPr lang="en-US"/>
               <a:t>Click to edit Master title style</a:t>
             </a:r>
-            <a:endParaRPr lang="en-US"/>
           </a:p>
         </p:txBody>
       </p:sp>
@@ -1010,38 +1037,37 @@
           <a:p>
             <a:pPr lvl="0"/>
             <a:r>
-              <a:rPr lang="en-US" smtClean="0"/>
+              <a:rPr lang="en-US"/>
               <a:t>Click to edit Master text styles</a:t>
             </a:r>
           </a:p>
           <a:p>
             <a:pPr lvl="1"/>
             <a:r>
-              <a:rPr lang="en-US" smtClean="0"/>
+              <a:rPr lang="en-US"/>
               <a:t>Second level</a:t>
             </a:r>
           </a:p>
           <a:p>
             <a:pPr lvl="2"/>
             <a:r>
-              <a:rPr lang="en-US" smtClean="0"/>
+              <a:rPr lang="en-US"/>
               <a:t>Third level</a:t>
             </a:r>
           </a:p>
           <a:p>
             <a:pPr lvl="3"/>
             <a:r>
-              <a:rPr lang="en-US" smtClean="0"/>
+              <a:rPr lang="en-US"/>
               <a:t>Fourth level</a:t>
             </a:r>
           </a:p>
           <a:p>
             <a:pPr lvl="4"/>
             <a:r>
-              <a:rPr lang="en-US" smtClean="0"/>
+              <a:rPr lang="en-US"/>
               <a:t>Fifth level</a:t>
             </a:r>
-            <a:endParaRPr lang="en-US"/>
           </a:p>
         </p:txBody>
       </p:sp>
@@ -1063,7 +1089,7 @@
             <a:fld id="{1D8BD707-D9CF-40AE-B4C6-C98DA3205C09}" type="datetimeFigureOut">
               <a:rPr lang="en-US" smtClean="0"/>
               <a:pPr/>
-              <a:t>06/03/16</a:t>
+              <a:t>5/25/18</a:t>
             </a:fld>
             <a:endParaRPr lang="en-US"/>
           </a:p>
@@ -1158,10 +1184,9 @@
           <a:lstStyle/>
           <a:p>
             <a:r>
-              <a:rPr lang="en-US" smtClean="0"/>
+              <a:rPr lang="en-US"/>
               <a:t>Click to edit Master title style</a:t>
             </a:r>
-            <a:endParaRPr lang="en-US"/>
           </a:p>
         </p:txBody>
       </p:sp>
@@ -1187,38 +1212,37 @@
           <a:p>
             <a:pPr lvl="0"/>
             <a:r>
-              <a:rPr lang="en-US" smtClean="0"/>
+              <a:rPr lang="en-US"/>
               <a:t>Click to edit Master text styles</a:t>
             </a:r>
           </a:p>
           <a:p>
             <a:pPr lvl="1"/>
             <a:r>
-              <a:rPr lang="en-US" smtClean="0"/>
+              <a:rPr lang="en-US"/>
               <a:t>Second level</a:t>
             </a:r>
           </a:p>
           <a:p>
             <a:pPr lvl="2"/>
             <a:r>
-              <a:rPr lang="en-US" smtClean="0"/>
+              <a:rPr lang="en-US"/>
               <a:t>Third level</a:t>
             </a:r>
           </a:p>
           <a:p>
             <a:pPr lvl="3"/>
             <a:r>
-              <a:rPr lang="en-US" smtClean="0"/>
+              <a:rPr lang="en-US"/>
               <a:t>Fourth level</a:t>
             </a:r>
           </a:p>
           <a:p>
             <a:pPr lvl="4"/>
             <a:r>
-              <a:rPr lang="en-US" smtClean="0"/>
+              <a:rPr lang="en-US"/>
               <a:t>Fifth level</a:t>
             </a:r>
-            <a:endParaRPr lang="en-US"/>
           </a:p>
         </p:txBody>
       </p:sp>
@@ -1240,7 +1264,7 @@
             <a:fld id="{1D8BD707-D9CF-40AE-B4C6-C98DA3205C09}" type="datetimeFigureOut">
               <a:rPr lang="en-US" smtClean="0"/>
               <a:pPr/>
-              <a:t>06/03/16</a:t>
+              <a:t>5/25/18</a:t>
             </a:fld>
             <a:endParaRPr lang="en-US"/>
           </a:p>
@@ -1330,10 +1354,9 @@
           <a:lstStyle/>
           <a:p>
             <a:r>
-              <a:rPr lang="en-US" smtClean="0"/>
+              <a:rPr lang="en-US"/>
               <a:t>Click to edit Master title style</a:t>
             </a:r>
-            <a:endParaRPr lang="en-US"/>
           </a:p>
         </p:txBody>
       </p:sp>
@@ -1354,38 +1377,37 @@
           <a:p>
             <a:pPr lvl="0"/>
             <a:r>
-              <a:rPr lang="en-US" smtClean="0"/>
+              <a:rPr lang="en-US"/>
               <a:t>Click to edit Master text styles</a:t>
             </a:r>
           </a:p>
           <a:p>
             <a:pPr lvl="1"/>
             <a:r>
-              <a:rPr lang="en-US" smtClean="0"/>
+              <a:rPr lang="en-US"/>
               <a:t>Second level</a:t>
             </a:r>
           </a:p>
           <a:p>
             <a:pPr lvl="2"/>
             <a:r>
-              <a:rPr lang="en-US" smtClean="0"/>
+              <a:rPr lang="en-US"/>
               <a:t>Third level</a:t>
             </a:r>
           </a:p>
           <a:p>
             <a:pPr lvl="3"/>
             <a:r>
-              <a:rPr lang="en-US" smtClean="0"/>
+              <a:rPr lang="en-US"/>
               <a:t>Fourth level</a:t>
             </a:r>
           </a:p>
           <a:p>
             <a:pPr lvl="4"/>
             <a:r>
-              <a:rPr lang="en-US" smtClean="0"/>
+              <a:rPr lang="en-US"/>
               <a:t>Fifth level</a:t>
             </a:r>
-            <a:endParaRPr lang="en-US"/>
           </a:p>
         </p:txBody>
       </p:sp>
@@ -1407,7 +1429,7 @@
             <a:fld id="{1D8BD707-D9CF-40AE-B4C6-C98DA3205C09}" type="datetimeFigureOut">
               <a:rPr lang="en-US" smtClean="0"/>
               <a:pPr/>
-              <a:t>06/03/16</a:t>
+              <a:t>5/25/18</a:t>
             </a:fld>
             <a:endParaRPr lang="en-US"/>
           </a:p>
@@ -1506,10 +1528,9 @@
           </a:lstStyle>
           <a:p>
             <a:r>
-              <a:rPr lang="en-US" smtClean="0"/>
+              <a:rPr lang="en-US"/>
               <a:t>Click to edit Master title style</a:t>
             </a:r>
-            <a:endParaRPr lang="en-US"/>
           </a:p>
         </p:txBody>
       </p:sp>
@@ -1626,7 +1647,7 @@
           <a:p>
             <a:pPr lvl="0"/>
             <a:r>
-              <a:rPr lang="en-US" smtClean="0"/>
+              <a:rPr lang="en-US"/>
               <a:t>Click to edit Master text styles</a:t>
             </a:r>
           </a:p>
@@ -1650,7 +1671,7 @@
             <a:fld id="{1D8BD707-D9CF-40AE-B4C6-C98DA3205C09}" type="datetimeFigureOut">
               <a:rPr lang="en-US" smtClean="0"/>
               <a:pPr/>
-              <a:t>06/03/16</a:t>
+              <a:t>5/25/18</a:t>
             </a:fld>
             <a:endParaRPr lang="en-US"/>
           </a:p>
@@ -1740,10 +1761,9 @@
           <a:lstStyle/>
           <a:p>
             <a:r>
-              <a:rPr lang="en-US" smtClean="0"/>
+              <a:rPr lang="en-US"/>
               <a:t>Click to edit Master title style</a:t>
             </a:r>
-            <a:endParaRPr lang="en-US"/>
           </a:p>
         </p:txBody>
       </p:sp>
@@ -1797,38 +1817,37 @@
           <a:p>
             <a:pPr lvl="0"/>
             <a:r>
-              <a:rPr lang="en-US" smtClean="0"/>
+              <a:rPr lang="en-US"/>
               <a:t>Click to edit Master text styles</a:t>
             </a:r>
           </a:p>
           <a:p>
             <a:pPr lvl="1"/>
             <a:r>
-              <a:rPr lang="en-US" smtClean="0"/>
+              <a:rPr lang="en-US"/>
               <a:t>Second level</a:t>
             </a:r>
           </a:p>
           <a:p>
             <a:pPr lvl="2"/>
             <a:r>
-              <a:rPr lang="en-US" smtClean="0"/>
+              <a:rPr lang="en-US"/>
               <a:t>Third level</a:t>
             </a:r>
           </a:p>
           <a:p>
             <a:pPr lvl="3"/>
             <a:r>
-              <a:rPr lang="en-US" smtClean="0"/>
+              <a:rPr lang="en-US"/>
               <a:t>Fourth level</a:t>
             </a:r>
           </a:p>
           <a:p>
             <a:pPr lvl="4"/>
             <a:r>
-              <a:rPr lang="en-US" smtClean="0"/>
+              <a:rPr lang="en-US"/>
               <a:t>Fifth level</a:t>
             </a:r>
-            <a:endParaRPr lang="en-US"/>
           </a:p>
         </p:txBody>
       </p:sp>
@@ -1882,38 +1901,37 @@
           <a:p>
             <a:pPr lvl="0"/>
             <a:r>
-              <a:rPr lang="en-US" smtClean="0"/>
+              <a:rPr lang="en-US"/>
               <a:t>Click to edit Master text styles</a:t>
             </a:r>
           </a:p>
           <a:p>
             <a:pPr lvl="1"/>
             <a:r>
-              <a:rPr lang="en-US" smtClean="0"/>
+              <a:rPr lang="en-US"/>
               <a:t>Second level</a:t>
             </a:r>
           </a:p>
           <a:p>
             <a:pPr lvl="2"/>
             <a:r>
-              <a:rPr lang="en-US" smtClean="0"/>
+              <a:rPr lang="en-US"/>
               <a:t>Third level</a:t>
             </a:r>
           </a:p>
           <a:p>
             <a:pPr lvl="3"/>
             <a:r>
-              <a:rPr lang="en-US" smtClean="0"/>
+              <a:rPr lang="en-US"/>
               <a:t>Fourth level</a:t>
             </a:r>
           </a:p>
           <a:p>
             <a:pPr lvl="4"/>
             <a:r>
-              <a:rPr lang="en-US" smtClean="0"/>
+              <a:rPr lang="en-US"/>
               <a:t>Fifth level</a:t>
             </a:r>
-            <a:endParaRPr lang="en-US"/>
           </a:p>
         </p:txBody>
       </p:sp>
@@ -1935,7 +1953,7 @@
             <a:fld id="{1D8BD707-D9CF-40AE-B4C6-C98DA3205C09}" type="datetimeFigureOut">
               <a:rPr lang="en-US" smtClean="0"/>
               <a:pPr/>
-              <a:t>06/03/16</a:t>
+              <a:t>5/25/18</a:t>
             </a:fld>
             <a:endParaRPr lang="en-US"/>
           </a:p>
@@ -2029,10 +2047,9 @@
           </a:lstStyle>
           <a:p>
             <a:r>
-              <a:rPr lang="en-US" smtClean="0"/>
+              <a:rPr lang="en-US"/>
               <a:t>Click to edit Master title style</a:t>
             </a:r>
-            <a:endParaRPr lang="en-US"/>
           </a:p>
         </p:txBody>
       </p:sp>
@@ -2095,7 +2112,7 @@
           <a:p>
             <a:pPr lvl="0"/>
             <a:r>
-              <a:rPr lang="en-US" smtClean="0"/>
+              <a:rPr lang="en-US"/>
               <a:t>Click to edit Master text styles</a:t>
             </a:r>
           </a:p>
@@ -2151,38 +2168,37 @@
           <a:p>
             <a:pPr lvl="0"/>
             <a:r>
-              <a:rPr lang="en-US" smtClean="0"/>
+              <a:rPr lang="en-US"/>
               <a:t>Click to edit Master text styles</a:t>
             </a:r>
           </a:p>
           <a:p>
             <a:pPr lvl="1"/>
             <a:r>
-              <a:rPr lang="en-US" smtClean="0"/>
+              <a:rPr lang="en-US"/>
               <a:t>Second level</a:t>
             </a:r>
           </a:p>
           <a:p>
             <a:pPr lvl="2"/>
             <a:r>
-              <a:rPr lang="en-US" smtClean="0"/>
+              <a:rPr lang="en-US"/>
               <a:t>Third level</a:t>
             </a:r>
           </a:p>
           <a:p>
             <a:pPr lvl="3"/>
             <a:r>
-              <a:rPr lang="en-US" smtClean="0"/>
+              <a:rPr lang="en-US"/>
               <a:t>Fourth level</a:t>
             </a:r>
           </a:p>
           <a:p>
             <a:pPr lvl="4"/>
             <a:r>
-              <a:rPr lang="en-US" smtClean="0"/>
+              <a:rPr lang="en-US"/>
               <a:t>Fifth level</a:t>
             </a:r>
-            <a:endParaRPr lang="en-US"/>
           </a:p>
         </p:txBody>
       </p:sp>
@@ -2245,7 +2261,7 @@
           <a:p>
             <a:pPr lvl="0"/>
             <a:r>
-              <a:rPr lang="en-US" smtClean="0"/>
+              <a:rPr lang="en-US"/>
               <a:t>Click to edit Master text styles</a:t>
             </a:r>
           </a:p>
@@ -2301,38 +2317,37 @@
           <a:p>
             <a:pPr lvl="0"/>
             <a:r>
-              <a:rPr lang="en-US" smtClean="0"/>
+              <a:rPr lang="en-US"/>
               <a:t>Click to edit Master text styles</a:t>
             </a:r>
           </a:p>
           <a:p>
             <a:pPr lvl="1"/>
             <a:r>
-              <a:rPr lang="en-US" smtClean="0"/>
+              <a:rPr lang="en-US"/>
               <a:t>Second level</a:t>
             </a:r>
           </a:p>
           <a:p>
             <a:pPr lvl="2"/>
             <a:r>
-              <a:rPr lang="en-US" smtClean="0"/>
+              <a:rPr lang="en-US"/>
               <a:t>Third level</a:t>
             </a:r>
           </a:p>
           <a:p>
             <a:pPr lvl="3"/>
             <a:r>
-              <a:rPr lang="en-US" smtClean="0"/>
+              <a:rPr lang="en-US"/>
               <a:t>Fourth level</a:t>
             </a:r>
           </a:p>
           <a:p>
             <a:pPr lvl="4"/>
             <a:r>
-              <a:rPr lang="en-US" smtClean="0"/>
+              <a:rPr lang="en-US"/>
               <a:t>Fifth level</a:t>
             </a:r>
-            <a:endParaRPr lang="en-US"/>
           </a:p>
         </p:txBody>
       </p:sp>
@@ -2354,7 +2369,7 @@
             <a:fld id="{1D8BD707-D9CF-40AE-B4C6-C98DA3205C09}" type="datetimeFigureOut">
               <a:rPr lang="en-US" smtClean="0"/>
               <a:pPr/>
-              <a:t>06/03/16</a:t>
+              <a:t>5/25/18</a:t>
             </a:fld>
             <a:endParaRPr lang="en-US"/>
           </a:p>
@@ -2444,10 +2459,9 @@
           <a:lstStyle/>
           <a:p>
             <a:r>
-              <a:rPr lang="en-US" smtClean="0"/>
+              <a:rPr lang="en-US"/>
               <a:t>Click to edit Master title style</a:t>
             </a:r>
-            <a:endParaRPr lang="en-US"/>
           </a:p>
         </p:txBody>
       </p:sp>
@@ -2469,7 +2483,7 @@
             <a:fld id="{1D8BD707-D9CF-40AE-B4C6-C98DA3205C09}" type="datetimeFigureOut">
               <a:rPr lang="en-US" smtClean="0"/>
               <a:pPr/>
-              <a:t>06/03/16</a:t>
+              <a:t>5/25/18</a:t>
             </a:fld>
             <a:endParaRPr lang="en-US"/>
           </a:p>
@@ -2561,7 +2575,7 @@
             <a:fld id="{1D8BD707-D9CF-40AE-B4C6-C98DA3205C09}" type="datetimeFigureOut">
               <a:rPr lang="en-US" smtClean="0"/>
               <a:pPr/>
-              <a:t>06/03/16</a:t>
+              <a:t>5/25/18</a:t>
             </a:fld>
             <a:endParaRPr lang="en-US"/>
           </a:p>
@@ -2660,10 +2674,9 @@
           </a:lstStyle>
           <a:p>
             <a:r>
-              <a:rPr lang="en-US" smtClean="0"/>
+              <a:rPr lang="en-US"/>
               <a:t>Click to edit Master title style</a:t>
             </a:r>
-            <a:endParaRPr lang="en-US"/>
           </a:p>
         </p:txBody>
       </p:sp>
@@ -2717,38 +2730,37 @@
           <a:p>
             <a:pPr lvl="0"/>
             <a:r>
-              <a:rPr lang="en-US" smtClean="0"/>
+              <a:rPr lang="en-US"/>
               <a:t>Click to edit Master text styles</a:t>
             </a:r>
           </a:p>
           <a:p>
             <a:pPr lvl="1"/>
             <a:r>
-              <a:rPr lang="en-US" smtClean="0"/>
+              <a:rPr lang="en-US"/>
               <a:t>Second level</a:t>
             </a:r>
           </a:p>
           <a:p>
             <a:pPr lvl="2"/>
             <a:r>
-              <a:rPr lang="en-US" smtClean="0"/>
+              <a:rPr lang="en-US"/>
               <a:t>Third level</a:t>
             </a:r>
           </a:p>
           <a:p>
             <a:pPr lvl="3"/>
             <a:r>
-              <a:rPr lang="en-US" smtClean="0"/>
+              <a:rPr lang="en-US"/>
               <a:t>Fourth level</a:t>
             </a:r>
           </a:p>
           <a:p>
             <a:pPr lvl="4"/>
             <a:r>
-              <a:rPr lang="en-US" smtClean="0"/>
+              <a:rPr lang="en-US"/>
               <a:t>Fifth level</a:t>
             </a:r>
-            <a:endParaRPr lang="en-US"/>
           </a:p>
         </p:txBody>
       </p:sp>
@@ -2811,7 +2823,7 @@
           <a:p>
             <a:pPr lvl="0"/>
             <a:r>
-              <a:rPr lang="en-US" smtClean="0"/>
+              <a:rPr lang="en-US"/>
               <a:t>Click to edit Master text styles</a:t>
             </a:r>
           </a:p>
@@ -2835,7 +2847,7 @@
             <a:fld id="{1D8BD707-D9CF-40AE-B4C6-C98DA3205C09}" type="datetimeFigureOut">
               <a:rPr lang="en-US" smtClean="0"/>
               <a:pPr/>
-              <a:t>06/03/16</a:t>
+              <a:t>5/25/18</a:t>
             </a:fld>
             <a:endParaRPr lang="en-US"/>
           </a:p>
@@ -2934,10 +2946,9 @@
           </a:lstStyle>
           <a:p>
             <a:r>
-              <a:rPr lang="en-US" smtClean="0"/>
+              <a:rPr lang="en-US"/>
               <a:t>Click to edit Master title style</a:t>
             </a:r>
-            <a:endParaRPr lang="en-US"/>
           </a:p>
         </p:txBody>
       </p:sp>
@@ -3061,7 +3072,7 @@
           <a:p>
             <a:pPr lvl="0"/>
             <a:r>
-              <a:rPr lang="en-US" smtClean="0"/>
+              <a:rPr lang="en-US"/>
               <a:t>Click to edit Master text styles</a:t>
             </a:r>
           </a:p>
@@ -3085,7 +3096,7 @@
             <a:fld id="{1D8BD707-D9CF-40AE-B4C6-C98DA3205C09}" type="datetimeFigureOut">
               <a:rPr lang="en-US" smtClean="0"/>
               <a:pPr/>
-              <a:t>06/03/16</a:t>
+              <a:t>5/25/18</a:t>
             </a:fld>
             <a:endParaRPr lang="en-US"/>
           </a:p>
@@ -3196,10 +3207,9 @@
           <a:lstStyle/>
           <a:p>
             <a:r>
-              <a:rPr lang="en-US" smtClean="0"/>
+              <a:rPr lang="en-US"/>
               <a:t>Click to edit Master title style</a:t>
             </a:r>
-            <a:endParaRPr lang="en-US"/>
           </a:p>
         </p:txBody>
       </p:sp>
@@ -3230,38 +3240,37 @@
           <a:p>
             <a:pPr lvl="0"/>
             <a:r>
-              <a:rPr lang="en-US" smtClean="0"/>
+              <a:rPr lang="en-US"/>
               <a:t>Click to edit Master text styles</a:t>
             </a:r>
           </a:p>
           <a:p>
             <a:pPr lvl="1"/>
             <a:r>
-              <a:rPr lang="en-US" smtClean="0"/>
+              <a:rPr lang="en-US"/>
               <a:t>Second level</a:t>
             </a:r>
           </a:p>
           <a:p>
             <a:pPr lvl="2"/>
             <a:r>
-              <a:rPr lang="en-US" smtClean="0"/>
+              <a:rPr lang="en-US"/>
               <a:t>Third level</a:t>
             </a:r>
           </a:p>
           <a:p>
             <a:pPr lvl="3"/>
             <a:r>
-              <a:rPr lang="en-US" smtClean="0"/>
+              <a:rPr lang="en-US"/>
               <a:t>Fourth level</a:t>
             </a:r>
           </a:p>
           <a:p>
             <a:pPr lvl="4"/>
             <a:r>
-              <a:rPr lang="en-US" smtClean="0"/>
+              <a:rPr lang="en-US"/>
               <a:t>Fifth level</a:t>
             </a:r>
-            <a:endParaRPr lang="en-US"/>
           </a:p>
         </p:txBody>
       </p:sp>
@@ -3301,7 +3310,7 @@
             <a:fld id="{1D8BD707-D9CF-40AE-B4C6-C98DA3205C09}" type="datetimeFigureOut">
               <a:rPr lang="en-US" smtClean="0"/>
               <a:pPr/>
-              <a:t>06/03/16</a:t>
+              <a:t>5/25/18</a:t>
             </a:fld>
             <a:endParaRPr lang="en-US"/>
           </a:p>
@@ -3695,7 +3704,7 @@
           <a:lstStyle/>
           <a:p>
             <a:r>
-              <a:rPr lang="en-GB" sz="6600" b="1" dirty="0" smtClean="0">
+              <a:rPr lang="en-GB" sz="6600" b="1" dirty="0">
                 <a:solidFill>
                   <a:schemeClr val="bg1"/>
                 </a:solidFill>
@@ -3704,13 +3713,6 @@
               </a:rPr>
               <a:t>The End</a:t>
             </a:r>
-            <a:endParaRPr lang="en-GB" sz="6600" b="1" dirty="0">
-              <a:solidFill>
-                <a:schemeClr val="bg1"/>
-              </a:solidFill>
-              <a:latin typeface="Courier New" pitchFamily="49" charset="0"/>
-              <a:cs typeface="Courier New" pitchFamily="49" charset="0"/>
-            </a:endParaRPr>
           </a:p>
         </p:txBody>
       </p:sp>
@@ -3748,13 +3750,6 @@
   <p:clrMapOvr>
     <a:masterClrMapping/>
   </p:clrMapOvr>
-  <p:timing>
-    <p:tnLst>
-      <p:par>
-        <p:cTn xmlns:p14="http://schemas.microsoft.com/office/powerpoint/2010/main" id="1" dur="indefinite" restart="never" nodeType="tmRoot"/>
-      </p:par>
-    </p:tnLst>
-  </p:timing>
 </p:sld>
 </file>
 
@@ -3798,7 +3793,7 @@
           <a:lstStyle/>
           <a:p>
             <a:r>
-              <a:rPr lang="en-GB" sz="6000" b="1" dirty="0" smtClean="0">
+              <a:rPr lang="en-GB" sz="6000" b="1" dirty="0">
                 <a:solidFill>
                   <a:schemeClr val="bg1"/>
                 </a:solidFill>
@@ -3807,13 +3802,6 @@
               </a:rPr>
               <a:t>Final, final recap…</a:t>
             </a:r>
-            <a:endParaRPr lang="en-GB" sz="6000" b="1" dirty="0">
-              <a:solidFill>
-                <a:schemeClr val="bg1"/>
-              </a:solidFill>
-              <a:latin typeface="Courier New" pitchFamily="49" charset="0"/>
-              <a:cs typeface="Courier New" pitchFamily="49" charset="0"/>
-            </a:endParaRPr>
           </a:p>
         </p:txBody>
       </p:sp>
@@ -3830,75 +3818,98 @@
         <p:spPr>
           <a:xfrm>
             <a:off x="457200" y="1600200"/>
-            <a:ext cx="8077200" cy="4724400"/>
+            <a:ext cx="8305800" cy="4724400"/>
           </a:xfrm>
         </p:spPr>
         <p:txBody>
           <a:bodyPr>
-            <a:normAutofit/>
+            <a:normAutofit lnSpcReduction="10000"/>
           </a:bodyPr>
           <a:lstStyle/>
           <a:p>
             <a:r>
-              <a:rPr lang="en-GB" dirty="0" smtClean="0">
+              <a:rPr lang="en-GB" dirty="0">
                 <a:solidFill>
                   <a:schemeClr val="bg1"/>
                 </a:solidFill>
                 <a:latin typeface="Courier New" pitchFamily="49" charset="0"/>
                 <a:cs typeface="Courier New" pitchFamily="49" charset="0"/>
               </a:rPr>
-              <a:t>Recognise – aware of architectural terms, analogies for each…</a:t>
-            </a:r>
-            <a:endParaRPr lang="en-GB" dirty="0" smtClean="0">
-              <a:solidFill>
-                <a:schemeClr val="bg1"/>
-              </a:solidFill>
-              <a:latin typeface="Courier New" pitchFamily="49" charset="0"/>
-              <a:cs typeface="Courier New" pitchFamily="49" charset="0"/>
-            </a:endParaRPr>
-          </a:p>
-          <a:p>
-            <a:r>
-              <a:rPr lang="en-GB" dirty="0" smtClean="0">
+              <a:t>Smells – Symptoms of hard to test</a:t>
+            </a:r>
+          </a:p>
+          <a:p>
+            <a:r>
+              <a:rPr lang="en-GB" dirty="0">
                 <a:solidFill>
                   <a:schemeClr val="bg1"/>
                 </a:solidFill>
                 <a:latin typeface="Courier New" pitchFamily="49" charset="0"/>
                 <a:cs typeface="Courier New" pitchFamily="49" charset="0"/>
               </a:rPr>
-              <a:t>Understand – how oracles and visualisation expose </a:t>
-            </a:r>
-            <a:r>
-              <a:rPr lang="en-GB" dirty="0" smtClean="0">
+              <a:t>Puzzle – using oracles to express architecture</a:t>
+            </a:r>
+          </a:p>
+          <a:p>
+            <a:r>
+              <a:rPr lang="en-GB" dirty="0">
                 <a:solidFill>
                   <a:schemeClr val="bg1"/>
                 </a:solidFill>
                 <a:latin typeface="Courier New" pitchFamily="49" charset="0"/>
                 <a:cs typeface="Courier New" pitchFamily="49" charset="0"/>
               </a:rPr>
-              <a:t>architectural understanding…</a:t>
-            </a:r>
-          </a:p>
-          <a:p>
-            <a:r>
-              <a:rPr lang="en-GB" dirty="0" smtClean="0">
+              <a:t>Canvas – mapping </a:t>
+            </a:r>
+            <a:r>
+              <a:rPr lang="en-GB">
                 <a:solidFill>
                   <a:schemeClr val="bg1"/>
                 </a:solidFill>
                 <a:latin typeface="Courier New" pitchFamily="49" charset="0"/>
                 <a:cs typeface="Courier New" pitchFamily="49" charset="0"/>
               </a:rPr>
-              <a:t>Apply – identify architectural risk and look for ways to improve testability!</a:t>
-            </a:r>
-            <a:endParaRPr lang="en-GB" dirty="0" smtClean="0">
-              <a:solidFill>
-                <a:schemeClr val="bg1"/>
-              </a:solidFill>
-              <a:latin typeface="Courier New" pitchFamily="49" charset="0"/>
-              <a:cs typeface="Courier New" pitchFamily="49" charset="0"/>
-            </a:endParaRPr>
-          </a:p>
-          <a:p>
+              <a:t>risk &amp; </a:t>
+            </a:r>
+            <a:r>
+              <a:rPr lang="en-GB" dirty="0">
+                <a:solidFill>
+                  <a:schemeClr val="bg1"/>
+                </a:solidFill>
+                <a:latin typeface="Courier New" pitchFamily="49" charset="0"/>
+                <a:cs typeface="Courier New" pitchFamily="49" charset="0"/>
+              </a:rPr>
+              <a:t>remedy</a:t>
+            </a:r>
+          </a:p>
+          <a:p>
+            <a:r>
+              <a:rPr lang="en-GB" dirty="0">
+                <a:solidFill>
+                  <a:schemeClr val="bg1"/>
+                </a:solidFill>
+                <a:latin typeface="Courier New" pitchFamily="49" charset="0"/>
+                <a:cs typeface="Courier New" pitchFamily="49" charset="0"/>
+              </a:rPr>
+              <a:t>Migration – testability &amp; changing architectures</a:t>
+            </a:r>
+          </a:p>
+          <a:p>
+            <a:r>
+              <a:rPr lang="en-GB" dirty="0">
+                <a:solidFill>
+                  <a:schemeClr val="bg1"/>
+                </a:solidFill>
+                <a:latin typeface="Courier New" pitchFamily="49" charset="0"/>
+                <a:cs typeface="Courier New" pitchFamily="49" charset="0"/>
+              </a:rPr>
+              <a:t>Infinite – maintaining your focus</a:t>
+            </a:r>
+          </a:p>
+          <a:p>
+            <a:pPr marL="0" indent="0">
+              <a:buNone/>
+            </a:pPr>
             <a:endParaRPr lang="en-GB" dirty="0">
               <a:solidFill>
                 <a:schemeClr val="bg1"/>
@@ -3934,7 +3945,7 @@
   <p:timing>
     <p:tnLst>
       <p:par>
-        <p:cTn xmlns:p14="http://schemas.microsoft.com/office/powerpoint/2010/main" id="1" dur="indefinite" restart="never" nodeType="tmRoot">
+        <p:cTn id="1" dur="indefinite" restart="never" nodeType="tmRoot">
           <p:childTnLst>
             <p:seq concurrent="1" nextAc="seek">
               <p:cTn id="2" dur="indefinite" nodeType="mainSeq">
@@ -4086,6 +4097,104 @@
                       </p:childTnLst>
                     </p:cTn>
                   </p:par>
+                  <p:par>
+                    <p:cTn id="15" fill="hold">
+                      <p:stCondLst>
+                        <p:cond delay="indefinite"/>
+                      </p:stCondLst>
+                      <p:childTnLst>
+                        <p:par>
+                          <p:cTn id="16" fill="hold">
+                            <p:stCondLst>
+                              <p:cond delay="0"/>
+                            </p:stCondLst>
+                            <p:childTnLst>
+                              <p:par>
+                                <p:cTn id="17" presetID="1" presetClass="entr" presetSubtype="0" fill="hold" nodeType="clickEffect">
+                                  <p:stCondLst>
+                                    <p:cond delay="0"/>
+                                  </p:stCondLst>
+                                  <p:childTnLst>
+                                    <p:set>
+                                      <p:cBhvr>
+                                        <p:cTn id="18" dur="1" fill="hold">
+                                          <p:stCondLst>
+                                            <p:cond delay="0"/>
+                                          </p:stCondLst>
+                                        </p:cTn>
+                                        <p:tgtEl>
+                                          <p:spTgt spid="3">
+                                            <p:txEl>
+                                              <p:pRg st="3" end="3"/>
+                                            </p:txEl>
+                                          </p:spTgt>
+                                        </p:tgtEl>
+                                        <p:attrNameLst>
+                                          <p:attrName>style.visibility</p:attrName>
+                                        </p:attrNameLst>
+                                      </p:cBhvr>
+                                      <p:to>
+                                        <p:strVal val="visible"/>
+                                      </p:to>
+                                    </p:set>
+                                  </p:childTnLst>
+                                </p:cTn>
+                              </p:par>
+                            </p:childTnLst>
+                          </p:cTn>
+                        </p:par>
+                      </p:childTnLst>
+                    </p:cTn>
+                  </p:par>
+                  <p:par>
+                    <p:cTn id="19" fill="hold">
+                      <p:stCondLst>
+                        <p:cond delay="indefinite"/>
+                      </p:stCondLst>
+                      <p:childTnLst>
+                        <p:par>
+                          <p:cTn id="20" fill="hold">
+                            <p:stCondLst>
+                              <p:cond delay="0"/>
+                            </p:stCondLst>
+                            <p:childTnLst>
+                              <p:par>
+                                <p:cTn id="21" presetID="1" presetClass="entr" presetSubtype="0" fill="hold" nodeType="clickEffect">
+                                  <p:stCondLst>
+                                    <p:cond delay="0"/>
+                                  </p:stCondLst>
+                                  <p:childTnLst>
+                                    <p:set>
+                                      <p:cBhvr>
+                                        <p:cTn id="22" dur="1" fill="hold">
+                                          <p:stCondLst>
+                                            <p:cond delay="0"/>
+                                          </p:stCondLst>
+                                        </p:cTn>
+                                        <p:tgtEl>
+                                          <p:spTgt spid="3">
+                                            <p:txEl>
+                                              <p:pRg st="4" end="4"/>
+                                            </p:txEl>
+                                          </p:spTgt>
+                                        </p:tgtEl>
+                                        <p:attrNameLst>
+                                          <p:attrName>style.visibility</p:attrName>
+                                        </p:attrNameLst>
+                                      </p:cBhvr>
+                                      <p:to>
+                                        <p:strVal val="visible"/>
+                                      </p:to>
+                                    </p:set>
+                                  </p:childTnLst>
+                                </p:cTn>
+                              </p:par>
+                            </p:childTnLst>
+                          </p:cTn>
+                        </p:par>
+                      </p:childTnLst>
+                    </p:cTn>
+                  </p:par>
                 </p:childTnLst>
               </p:cTn>
               <p:prevCondLst>
@@ -4151,7 +4260,7 @@
           <a:lstStyle/>
           <a:p>
             <a:r>
-              <a:rPr lang="en-GB" sz="4800" b="1" dirty="0" smtClean="0">
+              <a:rPr lang="en-GB" sz="4800" b="1" dirty="0">
                 <a:solidFill>
                   <a:schemeClr val="bg1"/>
                 </a:solidFill>
@@ -4160,13 +4269,6 @@
               </a:rPr>
               <a:t>Encore…</a:t>
             </a:r>
-            <a:endParaRPr lang="en-GB" sz="4800" b="1" dirty="0">
-              <a:solidFill>
-                <a:schemeClr val="bg1"/>
-              </a:solidFill>
-              <a:latin typeface="Courier New" pitchFamily="49" charset="0"/>
-              <a:cs typeface="Courier New" pitchFamily="49" charset="0"/>
-            </a:endParaRPr>
           </a:p>
         </p:txBody>
       </p:sp>
@@ -4216,13 +4318,6 @@
       </p:transition>
     </mc:Fallback>
   </mc:AlternateContent>
-  <p:timing>
-    <p:tnLst>
-      <p:par>
-        <p:cTn xmlns:p14="http://schemas.microsoft.com/office/powerpoint/2010/main" id="1" dur="indefinite" restart="never" nodeType="tmRoot"/>
-      </p:par>
-    </p:tnLst>
-  </p:timing>
 </p:sld>
 </file>
 

</xml_diff>